<commit_message>
new PT for pipeline functions with begin/process/end
</commit_message>
<xml_diff>
--- a/CYBER360-2.B-Profiles-Functions.pptx
+++ b/CYBER360-2.B-Profiles-Functions.pptx
@@ -19,6 +19,8 @@
     <p:sldId id="268" r:id="rId13"/>
     <p:sldId id="269" r:id="rId14"/>
     <p:sldId id="270" r:id="rId15"/>
+    <p:sldId id="280" r:id="rId16"/>
+    <p:sldId id="281" r:id="rId17"/>
   </p:sldIdLst>
   <p:sldSz cx="12192000" cy="6858000"/>
   <p:notesSz cx="6858000" cy="9144000"/>
@@ -609,7 +611,7 @@
           <a:p>
             <a:fld id="{71087A05-F855-4434-8DDE-39A8542098A6}" type="datetimeFigureOut">
               <a:rPr lang="en-US" smtClean="0"/>
-              <a:t>11/21/2024</a:t>
+              <a:t>1/28/2025</a:t>
             </a:fld>
             <a:endParaRPr lang="en-US"/>
           </a:p>
@@ -847,7 +849,7 @@
           <a:p>
             <a:fld id="{71087A05-F855-4434-8DDE-39A8542098A6}" type="datetimeFigureOut">
               <a:rPr lang="en-US" smtClean="0"/>
-              <a:t>11/21/2024</a:t>
+              <a:t>1/28/2025</a:t>
             </a:fld>
             <a:endParaRPr lang="en-US"/>
           </a:p>
@@ -1083,7 +1085,7 @@
           <a:p>
             <a:fld id="{421996D4-4A1C-4BBC-AA2B-FD5B7FC395A0}" type="datetime1">
               <a:rPr lang="en-US" smtClean="0"/>
-              <a:t>11/21/2024</a:t>
+              <a:t>1/28/2025</a:t>
             </a:fld>
             <a:endParaRPr lang="en-US"/>
           </a:p>
@@ -1386,7 +1388,7 @@
           <a:p>
             <a:fld id="{71087A05-F855-4434-8DDE-39A8542098A6}" type="datetimeFigureOut">
               <a:rPr lang="en-US" smtClean="0"/>
-              <a:t>11/21/2024</a:t>
+              <a:t>1/28/2025</a:t>
             </a:fld>
             <a:endParaRPr lang="en-US"/>
           </a:p>
@@ -1691,7 +1693,7 @@
           <a:p>
             <a:fld id="{71087A05-F855-4434-8DDE-39A8542098A6}" type="datetimeFigureOut">
               <a:rPr lang="en-US" smtClean="0"/>
-              <a:t>11/21/2024</a:t>
+              <a:t>1/28/2025</a:t>
             </a:fld>
             <a:endParaRPr lang="en-US"/>
           </a:p>
@@ -1994,7 +1996,7 @@
           <a:p>
             <a:fld id="{71087A05-F855-4434-8DDE-39A8542098A6}" type="datetimeFigureOut">
               <a:rPr lang="en-US" smtClean="0"/>
-              <a:t>11/21/2024</a:t>
+              <a:t>1/28/2025</a:t>
             </a:fld>
             <a:endParaRPr lang="en-US"/>
           </a:p>
@@ -2445,7 +2447,7 @@
           <a:p>
             <a:fld id="{71087A05-F855-4434-8DDE-39A8542098A6}" type="datetimeFigureOut">
               <a:rPr lang="en-US" smtClean="0"/>
-              <a:t>11/21/2024</a:t>
+              <a:t>1/28/2025</a:t>
             </a:fld>
             <a:endParaRPr lang="en-US"/>
           </a:p>
@@ -2618,7 +2620,7 @@
           <a:p>
             <a:fld id="{71087A05-F855-4434-8DDE-39A8542098A6}" type="datetimeFigureOut">
               <a:rPr lang="en-US" smtClean="0"/>
-              <a:t>11/21/2024</a:t>
+              <a:t>1/28/2025</a:t>
             </a:fld>
             <a:endParaRPr lang="en-US"/>
           </a:p>
@@ -2755,7 +2757,7 @@
           <a:p>
             <a:fld id="{71087A05-F855-4434-8DDE-39A8542098A6}" type="datetimeFigureOut">
               <a:rPr lang="en-US" smtClean="0"/>
-              <a:t>11/21/2024</a:t>
+              <a:t>1/28/2025</a:t>
             </a:fld>
             <a:endParaRPr lang="en-US"/>
           </a:p>
@@ -3099,7 +3101,7 @@
           <a:p>
             <a:fld id="{71087A05-F855-4434-8DDE-39A8542098A6}" type="datetimeFigureOut">
               <a:rPr lang="en-US" smtClean="0"/>
-              <a:t>11/21/2024</a:t>
+              <a:t>1/28/2025</a:t>
             </a:fld>
             <a:endParaRPr lang="en-US"/>
           </a:p>
@@ -3423,7 +3425,7 @@
           <a:p>
             <a:fld id="{71087A05-F855-4434-8DDE-39A8542098A6}" type="datetimeFigureOut">
               <a:rPr lang="en-US" smtClean="0"/>
-              <a:t>11/21/2024</a:t>
+              <a:t>1/28/2025</a:t>
             </a:fld>
             <a:endParaRPr lang="en-US"/>
           </a:p>
@@ -5252,6 +5254,710 @@
     <p:extLst>
       <p:ext uri="{BB962C8B-B14F-4D97-AF65-F5344CB8AC3E}">
         <p14:creationId xmlns:p14="http://schemas.microsoft.com/office/powerpoint/2010/main" val="657795359"/>
+      </p:ext>
+    </p:extLst>
+  </p:cSld>
+  <p:clrMapOvr>
+    <a:masterClrMapping/>
+  </p:clrMapOvr>
+</p:sld>
+</file>
+
+<file path=ppt/slides/slide15.xml><?xml version="1.0" encoding="utf-8"?>
+<p:sld xmlns:a="http://schemas.openxmlformats.org/drawingml/2006/main" xmlns:r="http://schemas.openxmlformats.org/officeDocument/2006/relationships" xmlns:p="http://schemas.openxmlformats.org/presentationml/2006/main">
+  <p:cSld>
+    <p:spTree>
+      <p:nvGrpSpPr>
+        <p:cNvPr id="1" name=""/>
+        <p:cNvGrpSpPr/>
+        <p:nvPr/>
+      </p:nvGrpSpPr>
+      <p:grpSpPr>
+        <a:xfrm>
+          <a:off x="0" y="0"/>
+          <a:ext cx="0" cy="0"/>
+          <a:chOff x="0" y="0"/>
+          <a:chExt cx="0" cy="0"/>
+        </a:xfrm>
+      </p:grpSpPr>
+      <p:sp>
+        <p:nvSpPr>
+          <p:cNvPr id="2" name="Text Placeholder 1">
+            <a:extLst>
+              <a:ext uri="{FF2B5EF4-FFF2-40B4-BE49-F238E27FC236}">
+                <a16:creationId xmlns:a16="http://schemas.microsoft.com/office/drawing/2014/main" id="{361EE6A6-565D-6719-0FBC-5CFE8D6A76E8}"/>
+              </a:ext>
+            </a:extLst>
+          </p:cNvPr>
+          <p:cNvSpPr>
+            <a:spLocks noGrp="1"/>
+          </p:cNvSpPr>
+          <p:nvPr>
+            <p:ph type="body" sz="quarter" idx="10"/>
+          </p:nvPr>
+        </p:nvSpPr>
+        <p:spPr>
+          <a:xfrm>
+            <a:off x="323529" y="1225334"/>
+            <a:ext cx="11573197" cy="724247"/>
+          </a:xfrm>
+        </p:spPr>
+        <p:txBody>
+          <a:bodyPr>
+            <a:normAutofit fontScale="85000" lnSpcReduction="10000"/>
+          </a:bodyPr>
+          <a:lstStyle/>
+          <a:p>
+            <a:pPr algn="r"/>
+            <a:r>
+              <a:rPr lang="en-US" i="1" dirty="0"/>
+              <a:t>PT: function with begin/process/end blocks (1) </a:t>
+            </a:r>
+          </a:p>
+        </p:txBody>
+      </p:sp>
+      <p:sp>
+        <p:nvSpPr>
+          <p:cNvPr id="3" name="TextBox 2">
+            <a:extLst>
+              <a:ext uri="{FF2B5EF4-FFF2-40B4-BE49-F238E27FC236}">
+                <a16:creationId xmlns:a16="http://schemas.microsoft.com/office/drawing/2014/main" id="{ADD8957C-88E6-A920-4979-2BDA9406B518}"/>
+              </a:ext>
+            </a:extLst>
+          </p:cNvPr>
+          <p:cNvSpPr txBox="1"/>
+          <p:nvPr/>
+        </p:nvSpPr>
+        <p:spPr>
+          <a:xfrm>
+            <a:off x="1268392" y="2045328"/>
+            <a:ext cx="9655207" cy="4678204"/>
+          </a:xfrm>
+          <a:prstGeom prst="rect">
+            <a:avLst/>
+          </a:prstGeom>
+          <a:noFill/>
+        </p:spPr>
+        <p:txBody>
+          <a:bodyPr wrap="square" rtlCol="0">
+            <a:spAutoFit/>
+          </a:bodyPr>
+          <a:lstStyle/>
+          <a:p>
+            <a:pPr lvl="1" algn="r"/>
+            <a:r>
+              <a:rPr lang="en-US" sz="2000" i="1" dirty="0"/>
+              <a:t>Here’s an example that finds multiples of 5 or 7 in a list of integers:</a:t>
+            </a:r>
+          </a:p>
+          <a:p>
+            <a:pPr lvl="1"/>
+            <a:endParaRPr lang="en-US" sz="2000" dirty="0"/>
+          </a:p>
+          <a:p>
+            <a:r>
+              <a:rPr lang="en-US" b="0" dirty="0">
+                <a:effectLst/>
+                <a:latin typeface="Consolas" panose="020B0609020204030204" pitchFamily="49" charset="0"/>
+              </a:rPr>
+              <a:t>	function Find-</a:t>
+            </a:r>
+            <a:r>
+              <a:rPr lang="en-US" b="0" dirty="0" err="1">
+                <a:effectLst/>
+                <a:latin typeface="Consolas" panose="020B0609020204030204" pitchFamily="49" charset="0"/>
+              </a:rPr>
+              <a:t>FiveSevenMultiples</a:t>
+            </a:r>
+            <a:r>
+              <a:rPr lang="en-US" b="0" dirty="0">
+                <a:effectLst/>
+                <a:latin typeface="Consolas" panose="020B0609020204030204" pitchFamily="49" charset="0"/>
+              </a:rPr>
+              <a:t> {</a:t>
+            </a:r>
+          </a:p>
+          <a:p>
+            <a:r>
+              <a:rPr lang="en-US" b="0" dirty="0">
+                <a:effectLst/>
+                <a:latin typeface="Consolas" panose="020B0609020204030204" pitchFamily="49" charset="0"/>
+              </a:rPr>
+              <a:t>	    param([Parameter(Mandatory, </a:t>
+            </a:r>
+            <a:r>
+              <a:rPr lang="en-US" b="0" dirty="0" err="1">
+                <a:effectLst/>
+                <a:latin typeface="Consolas" panose="020B0609020204030204" pitchFamily="49" charset="0"/>
+              </a:rPr>
+              <a:t>ValueFromPipeline</a:t>
+            </a:r>
+            <a:r>
+              <a:rPr lang="en-US" b="0" dirty="0">
+                <a:effectLst/>
+                <a:latin typeface="Consolas" panose="020B0609020204030204" pitchFamily="49" charset="0"/>
+              </a:rPr>
+              <a:t>)]$integers)</a:t>
+            </a:r>
+          </a:p>
+          <a:p>
+            <a:r>
+              <a:rPr lang="en-US" b="0" dirty="0">
+                <a:effectLst/>
+                <a:latin typeface="Consolas" panose="020B0609020204030204" pitchFamily="49" charset="0"/>
+              </a:rPr>
+              <a:t>	    begin { $fives=$sevens=@() }</a:t>
+            </a:r>
+          </a:p>
+          <a:p>
+            <a:r>
+              <a:rPr lang="en-US" b="0" dirty="0">
+                <a:effectLst/>
+                <a:latin typeface="Consolas" panose="020B0609020204030204" pitchFamily="49" charset="0"/>
+              </a:rPr>
+              <a:t>	    process {</a:t>
+            </a:r>
+          </a:p>
+          <a:p>
+            <a:r>
+              <a:rPr lang="en-US" b="0" dirty="0">
+                <a:effectLst/>
+                <a:latin typeface="Consolas" panose="020B0609020204030204" pitchFamily="49" charset="0"/>
+              </a:rPr>
+              <a:t>	        foreach($</a:t>
+            </a:r>
+            <a:r>
+              <a:rPr lang="en-US" b="0" dirty="0" err="1">
+                <a:effectLst/>
+                <a:latin typeface="Consolas" panose="020B0609020204030204" pitchFamily="49" charset="0"/>
+              </a:rPr>
+              <a:t>i</a:t>
+            </a:r>
+            <a:r>
+              <a:rPr lang="en-US" b="0" dirty="0">
+                <a:effectLst/>
+                <a:latin typeface="Consolas" panose="020B0609020204030204" pitchFamily="49" charset="0"/>
+              </a:rPr>
+              <a:t> in $integers) {</a:t>
+            </a:r>
+          </a:p>
+          <a:p>
+            <a:r>
+              <a:rPr lang="en-US" b="0" dirty="0">
+                <a:effectLst/>
+                <a:latin typeface="Consolas" panose="020B0609020204030204" pitchFamily="49" charset="0"/>
+              </a:rPr>
+              <a:t>	            if ($</a:t>
+            </a:r>
+            <a:r>
+              <a:rPr lang="en-US" b="0" dirty="0" err="1">
+                <a:effectLst/>
+                <a:latin typeface="Consolas" panose="020B0609020204030204" pitchFamily="49" charset="0"/>
+              </a:rPr>
+              <a:t>i</a:t>
+            </a:r>
+            <a:r>
+              <a:rPr lang="en-US" b="0" dirty="0">
+                <a:effectLst/>
+                <a:latin typeface="Consolas" panose="020B0609020204030204" pitchFamily="49" charset="0"/>
+              </a:rPr>
+              <a:t> % 5 -eq 0) { $fives += $</a:t>
+            </a:r>
+            <a:r>
+              <a:rPr lang="en-US" b="0" dirty="0" err="1">
+                <a:effectLst/>
+                <a:latin typeface="Consolas" panose="020B0609020204030204" pitchFamily="49" charset="0"/>
+              </a:rPr>
+              <a:t>i</a:t>
+            </a:r>
+            <a:r>
+              <a:rPr lang="en-US" b="0" dirty="0">
+                <a:effectLst/>
+                <a:latin typeface="Consolas" panose="020B0609020204030204" pitchFamily="49" charset="0"/>
+              </a:rPr>
+              <a:t> }</a:t>
+            </a:r>
+          </a:p>
+          <a:p>
+            <a:r>
+              <a:rPr lang="en-US" b="0" dirty="0">
+                <a:effectLst/>
+                <a:latin typeface="Consolas" panose="020B0609020204030204" pitchFamily="49" charset="0"/>
+              </a:rPr>
+              <a:t>	            if ($</a:t>
+            </a:r>
+            <a:r>
+              <a:rPr lang="en-US" b="0" dirty="0" err="1">
+                <a:effectLst/>
+                <a:latin typeface="Consolas" panose="020B0609020204030204" pitchFamily="49" charset="0"/>
+              </a:rPr>
+              <a:t>i</a:t>
+            </a:r>
+            <a:r>
+              <a:rPr lang="en-US" b="0" dirty="0">
+                <a:effectLst/>
+                <a:latin typeface="Consolas" panose="020B0609020204030204" pitchFamily="49" charset="0"/>
+              </a:rPr>
+              <a:t> % 7 -eq 0) { $sevens += $</a:t>
+            </a:r>
+            <a:r>
+              <a:rPr lang="en-US" b="0" dirty="0" err="1">
+                <a:effectLst/>
+                <a:latin typeface="Consolas" panose="020B0609020204030204" pitchFamily="49" charset="0"/>
+              </a:rPr>
+              <a:t>i</a:t>
+            </a:r>
+            <a:r>
+              <a:rPr lang="en-US" b="0" dirty="0">
+                <a:effectLst/>
+                <a:latin typeface="Consolas" panose="020B0609020204030204" pitchFamily="49" charset="0"/>
+              </a:rPr>
+              <a:t> }</a:t>
+            </a:r>
+          </a:p>
+          <a:p>
+            <a:r>
+              <a:rPr lang="en-US" b="0" dirty="0">
+                <a:effectLst/>
+                <a:latin typeface="Consolas" panose="020B0609020204030204" pitchFamily="49" charset="0"/>
+              </a:rPr>
+              <a:t>	        }</a:t>
+            </a:r>
+          </a:p>
+          <a:p>
+            <a:r>
+              <a:rPr lang="en-US" b="0" dirty="0">
+                <a:effectLst/>
+                <a:latin typeface="Consolas" panose="020B0609020204030204" pitchFamily="49" charset="0"/>
+              </a:rPr>
+              <a:t>	    }</a:t>
+            </a:r>
+          </a:p>
+          <a:p>
+            <a:r>
+              <a:rPr lang="en-US" b="0" dirty="0">
+                <a:effectLst/>
+                <a:latin typeface="Consolas" panose="020B0609020204030204" pitchFamily="49" charset="0"/>
+              </a:rPr>
+              <a:t>	    end { return @{"fives"=$fives;"sevens"=$sevens;} }</a:t>
+            </a:r>
+          </a:p>
+          <a:p>
+            <a:r>
+              <a:rPr lang="en-US" b="0" dirty="0">
+                <a:effectLst/>
+                <a:latin typeface="Consolas" panose="020B0609020204030204" pitchFamily="49" charset="0"/>
+              </a:rPr>
+              <a:t>	}</a:t>
+            </a:r>
+          </a:p>
+          <a:p>
+            <a:endParaRPr lang="en-US" sz="2000" dirty="0"/>
+          </a:p>
+          <a:p>
+            <a:r>
+              <a:rPr lang="en-US" sz="2000" b="1" dirty="0">
+                <a:latin typeface="Consolas" panose="020B0609020204030204" pitchFamily="49" charset="0"/>
+              </a:rPr>
+              <a:t>PS&gt; 1..19 | Find-</a:t>
+            </a:r>
+            <a:r>
+              <a:rPr lang="en-US" sz="2000" b="1" dirty="0" err="1">
+                <a:latin typeface="Consolas" panose="020B0609020204030204" pitchFamily="49" charset="0"/>
+              </a:rPr>
+              <a:t>FiveSevenMultiples</a:t>
+            </a:r>
+            <a:endParaRPr lang="en-US" sz="2000" dirty="0"/>
+          </a:p>
+          <a:p>
+            <a:pPr algn="r"/>
+            <a:r>
+              <a:rPr lang="en-US" sz="2000" dirty="0"/>
+              <a:t># returns:  </a:t>
+            </a:r>
+            <a:r>
+              <a:rPr lang="en-US" sz="2000" b="1" dirty="0">
+                <a:latin typeface="Consolas" panose="020B0609020204030204" pitchFamily="49" charset="0"/>
+              </a:rPr>
+              <a:t>fives: {5, 10, 15}; sevens: {7, 14}</a:t>
+            </a:r>
+          </a:p>
+        </p:txBody>
+      </p:sp>
+    </p:spTree>
+    <p:extLst>
+      <p:ext uri="{BB962C8B-B14F-4D97-AF65-F5344CB8AC3E}">
+        <p14:creationId xmlns:p14="http://schemas.microsoft.com/office/powerpoint/2010/main" val="1464749429"/>
+      </p:ext>
+    </p:extLst>
+  </p:cSld>
+  <p:clrMapOvr>
+    <a:masterClrMapping/>
+  </p:clrMapOvr>
+</p:sld>
+</file>
+
+<file path=ppt/slides/slide16.xml><?xml version="1.0" encoding="utf-8"?>
+<p:sld xmlns:a="http://schemas.openxmlformats.org/drawingml/2006/main" xmlns:r="http://schemas.openxmlformats.org/officeDocument/2006/relationships" xmlns:p="http://schemas.openxmlformats.org/presentationml/2006/main">
+  <p:cSld>
+    <p:spTree>
+      <p:nvGrpSpPr>
+        <p:cNvPr id="1" name="">
+          <a:extLst>
+            <a:ext uri="{FF2B5EF4-FFF2-40B4-BE49-F238E27FC236}">
+              <a16:creationId xmlns:a16="http://schemas.microsoft.com/office/drawing/2014/main" id="{04A2DB4B-CCF6-2051-6538-E152350249BB}"/>
+            </a:ext>
+          </a:extLst>
+        </p:cNvPr>
+        <p:cNvGrpSpPr/>
+        <p:nvPr/>
+      </p:nvGrpSpPr>
+      <p:grpSpPr>
+        <a:xfrm>
+          <a:off x="0" y="0"/>
+          <a:ext cx="0" cy="0"/>
+          <a:chOff x="0" y="0"/>
+          <a:chExt cx="0" cy="0"/>
+        </a:xfrm>
+      </p:grpSpPr>
+      <p:sp>
+        <p:nvSpPr>
+          <p:cNvPr id="2" name="Text Placeholder 1">
+            <a:extLst>
+              <a:ext uri="{FF2B5EF4-FFF2-40B4-BE49-F238E27FC236}">
+                <a16:creationId xmlns:a16="http://schemas.microsoft.com/office/drawing/2014/main" id="{93125C08-C964-1188-E290-E4EDD37DB1E9}"/>
+              </a:ext>
+            </a:extLst>
+          </p:cNvPr>
+          <p:cNvSpPr>
+            <a:spLocks noGrp="1"/>
+          </p:cNvSpPr>
+          <p:nvPr>
+            <p:ph type="body" sz="quarter" idx="10"/>
+          </p:nvPr>
+        </p:nvSpPr>
+        <p:spPr>
+          <a:xfrm>
+            <a:off x="314385" y="1225334"/>
+            <a:ext cx="11573197" cy="724247"/>
+          </a:xfrm>
+        </p:spPr>
+        <p:txBody>
+          <a:bodyPr>
+            <a:normAutofit fontScale="85000" lnSpcReduction="10000"/>
+          </a:bodyPr>
+          <a:lstStyle/>
+          <a:p>
+            <a:pPr algn="r"/>
+            <a:r>
+              <a:rPr lang="en-US" i="1" dirty="0"/>
+              <a:t>PT: function with begin/process/end blocks (2) </a:t>
+            </a:r>
+          </a:p>
+        </p:txBody>
+      </p:sp>
+      <p:sp>
+        <p:nvSpPr>
+          <p:cNvPr id="3" name="TextBox 2">
+            <a:extLst>
+              <a:ext uri="{FF2B5EF4-FFF2-40B4-BE49-F238E27FC236}">
+                <a16:creationId xmlns:a16="http://schemas.microsoft.com/office/drawing/2014/main" id="{5EB57C1E-CB29-9CBD-CE19-A15FDFEFDB5C}"/>
+              </a:ext>
+            </a:extLst>
+          </p:cNvPr>
+          <p:cNvSpPr txBox="1"/>
+          <p:nvPr/>
+        </p:nvSpPr>
+        <p:spPr>
+          <a:xfrm>
+            <a:off x="1268392" y="2045328"/>
+            <a:ext cx="9655207" cy="4370427"/>
+          </a:xfrm>
+          <a:prstGeom prst="rect">
+            <a:avLst/>
+          </a:prstGeom>
+          <a:noFill/>
+        </p:spPr>
+        <p:txBody>
+          <a:bodyPr wrap="square" rtlCol="0">
+            <a:spAutoFit/>
+          </a:bodyPr>
+          <a:lstStyle/>
+          <a:p>
+            <a:r>
+              <a:rPr lang="en-US" b="0" dirty="0">
+                <a:effectLst/>
+                <a:latin typeface="Consolas" panose="020B0609020204030204" pitchFamily="49" charset="0"/>
+              </a:rPr>
+              <a:t>	function Find-</a:t>
+            </a:r>
+            <a:r>
+              <a:rPr lang="en-US" b="0" dirty="0" err="1">
+                <a:effectLst/>
+                <a:latin typeface="Consolas" panose="020B0609020204030204" pitchFamily="49" charset="0"/>
+              </a:rPr>
+              <a:t>FiveSevenMultiples</a:t>
+            </a:r>
+            <a:r>
+              <a:rPr lang="en-US" b="0" dirty="0">
+                <a:effectLst/>
+                <a:latin typeface="Consolas" panose="020B0609020204030204" pitchFamily="49" charset="0"/>
+              </a:rPr>
+              <a:t> {</a:t>
+            </a:r>
+          </a:p>
+          <a:p>
+            <a:r>
+              <a:rPr lang="en-US" b="0" dirty="0">
+                <a:effectLst/>
+                <a:latin typeface="Consolas" panose="020B0609020204030204" pitchFamily="49" charset="0"/>
+              </a:rPr>
+              <a:t>	    param([Parameter(Mandatory, </a:t>
+            </a:r>
+            <a:r>
+              <a:rPr lang="en-US" b="0" dirty="0" err="1">
+                <a:effectLst/>
+                <a:latin typeface="Consolas" panose="020B0609020204030204" pitchFamily="49" charset="0"/>
+              </a:rPr>
+              <a:t>ValueFromPipeline</a:t>
+            </a:r>
+            <a:r>
+              <a:rPr lang="en-US" b="0" dirty="0">
+                <a:effectLst/>
+                <a:latin typeface="Consolas" panose="020B0609020204030204" pitchFamily="49" charset="0"/>
+              </a:rPr>
+              <a:t>)]$integers)</a:t>
+            </a:r>
+          </a:p>
+          <a:p>
+            <a:r>
+              <a:rPr lang="en-US" b="0" dirty="0">
+                <a:effectLst/>
+                <a:latin typeface="Consolas" panose="020B0609020204030204" pitchFamily="49" charset="0"/>
+              </a:rPr>
+              <a:t>	    begin { $fives=$sevens=@() }</a:t>
+            </a:r>
+          </a:p>
+          <a:p>
+            <a:r>
+              <a:rPr lang="en-US" b="0" dirty="0">
+                <a:effectLst/>
+                <a:latin typeface="Consolas" panose="020B0609020204030204" pitchFamily="49" charset="0"/>
+              </a:rPr>
+              <a:t>	    process {</a:t>
+            </a:r>
+          </a:p>
+          <a:p>
+            <a:r>
+              <a:rPr lang="en-US" b="0" dirty="0">
+                <a:effectLst/>
+                <a:latin typeface="Consolas" panose="020B0609020204030204" pitchFamily="49" charset="0"/>
+              </a:rPr>
+              <a:t>	        foreach($</a:t>
+            </a:r>
+            <a:r>
+              <a:rPr lang="en-US" b="0" dirty="0" err="1">
+                <a:effectLst/>
+                <a:latin typeface="Consolas" panose="020B0609020204030204" pitchFamily="49" charset="0"/>
+              </a:rPr>
+              <a:t>i</a:t>
+            </a:r>
+            <a:r>
+              <a:rPr lang="en-US" b="0" dirty="0">
+                <a:effectLst/>
+                <a:latin typeface="Consolas" panose="020B0609020204030204" pitchFamily="49" charset="0"/>
+              </a:rPr>
+              <a:t> in $integers) {</a:t>
+            </a:r>
+          </a:p>
+          <a:p>
+            <a:r>
+              <a:rPr lang="en-US" b="0" dirty="0">
+                <a:effectLst/>
+                <a:latin typeface="Consolas" panose="020B0609020204030204" pitchFamily="49" charset="0"/>
+              </a:rPr>
+              <a:t>	            if ($</a:t>
+            </a:r>
+            <a:r>
+              <a:rPr lang="en-US" b="0" dirty="0" err="1">
+                <a:effectLst/>
+                <a:latin typeface="Consolas" panose="020B0609020204030204" pitchFamily="49" charset="0"/>
+              </a:rPr>
+              <a:t>i</a:t>
+            </a:r>
+            <a:r>
+              <a:rPr lang="en-US" b="0" dirty="0">
+                <a:effectLst/>
+                <a:latin typeface="Consolas" panose="020B0609020204030204" pitchFamily="49" charset="0"/>
+              </a:rPr>
+              <a:t> % 5 -eq 0) { $fives += $</a:t>
+            </a:r>
+            <a:r>
+              <a:rPr lang="en-US" b="0" dirty="0" err="1">
+                <a:effectLst/>
+                <a:latin typeface="Consolas" panose="020B0609020204030204" pitchFamily="49" charset="0"/>
+              </a:rPr>
+              <a:t>i</a:t>
+            </a:r>
+            <a:r>
+              <a:rPr lang="en-US" b="0" dirty="0">
+                <a:effectLst/>
+                <a:latin typeface="Consolas" panose="020B0609020204030204" pitchFamily="49" charset="0"/>
+              </a:rPr>
+              <a:t> }</a:t>
+            </a:r>
+          </a:p>
+          <a:p>
+            <a:r>
+              <a:rPr lang="en-US" b="0" dirty="0">
+                <a:effectLst/>
+                <a:latin typeface="Consolas" panose="020B0609020204030204" pitchFamily="49" charset="0"/>
+              </a:rPr>
+              <a:t>	            if ($</a:t>
+            </a:r>
+            <a:r>
+              <a:rPr lang="en-US" b="0" dirty="0" err="1">
+                <a:effectLst/>
+                <a:latin typeface="Consolas" panose="020B0609020204030204" pitchFamily="49" charset="0"/>
+              </a:rPr>
+              <a:t>i</a:t>
+            </a:r>
+            <a:r>
+              <a:rPr lang="en-US" b="0" dirty="0">
+                <a:effectLst/>
+                <a:latin typeface="Consolas" panose="020B0609020204030204" pitchFamily="49" charset="0"/>
+              </a:rPr>
+              <a:t> % 7 -eq 0) { $sevens += $</a:t>
+            </a:r>
+            <a:r>
+              <a:rPr lang="en-US" b="0" dirty="0" err="1">
+                <a:effectLst/>
+                <a:latin typeface="Consolas" panose="020B0609020204030204" pitchFamily="49" charset="0"/>
+              </a:rPr>
+              <a:t>i</a:t>
+            </a:r>
+            <a:r>
+              <a:rPr lang="en-US" b="0" dirty="0">
+                <a:effectLst/>
+                <a:latin typeface="Consolas" panose="020B0609020204030204" pitchFamily="49" charset="0"/>
+              </a:rPr>
+              <a:t> }</a:t>
+            </a:r>
+          </a:p>
+          <a:p>
+            <a:r>
+              <a:rPr lang="en-US" b="0" dirty="0">
+                <a:effectLst/>
+                <a:latin typeface="Consolas" panose="020B0609020204030204" pitchFamily="49" charset="0"/>
+              </a:rPr>
+              <a:t>	        }</a:t>
+            </a:r>
+          </a:p>
+          <a:p>
+            <a:r>
+              <a:rPr lang="en-US" b="0" dirty="0">
+                <a:effectLst/>
+                <a:latin typeface="Consolas" panose="020B0609020204030204" pitchFamily="49" charset="0"/>
+              </a:rPr>
+              <a:t>	    }</a:t>
+            </a:r>
+          </a:p>
+          <a:p>
+            <a:r>
+              <a:rPr lang="en-US" b="0" dirty="0">
+                <a:effectLst/>
+                <a:latin typeface="Consolas" panose="020B0609020204030204" pitchFamily="49" charset="0"/>
+              </a:rPr>
+              <a:t>	    end { return @{"fives"=$fives;"sevens"=$sevens;} }</a:t>
+            </a:r>
+          </a:p>
+          <a:p>
+            <a:r>
+              <a:rPr lang="en-US" b="0" dirty="0">
+                <a:effectLst/>
+                <a:latin typeface="Consolas" panose="020B0609020204030204" pitchFamily="49" charset="0"/>
+              </a:rPr>
+              <a:t>	}</a:t>
+            </a:r>
+          </a:p>
+          <a:p>
+            <a:endParaRPr lang="en-US" sz="2000" dirty="0"/>
+          </a:p>
+          <a:p>
+            <a:pPr algn="r"/>
+            <a:r>
+              <a:rPr lang="en-US" sz="2000" i="1" dirty="0"/>
+              <a:t>In this example, the </a:t>
+            </a:r>
+            <a:r>
+              <a:rPr lang="en-US" sz="2000" b="1" dirty="0"/>
+              <a:t>begin</a:t>
+            </a:r>
+            <a:r>
+              <a:rPr lang="en-US" sz="2000" i="1" dirty="0"/>
+              <a:t> code block runs once </a:t>
+            </a:r>
+            <a:r>
+              <a:rPr lang="en-US" sz="2000" i="1" u="sng" dirty="0"/>
+              <a:t>before</a:t>
+            </a:r>
+            <a:r>
+              <a:rPr lang="en-US" sz="2000" i="1" dirty="0"/>
+              <a:t> any pipeline input.</a:t>
+            </a:r>
+          </a:p>
+          <a:p>
+            <a:pPr algn="r"/>
+            <a:r>
+              <a:rPr lang="en-US" sz="2000" i="1" dirty="0"/>
+              <a:t>The </a:t>
+            </a:r>
+            <a:r>
+              <a:rPr lang="en-US" sz="2000" b="1" dirty="0"/>
+              <a:t>process</a:t>
+            </a:r>
+            <a:r>
+              <a:rPr lang="en-US" sz="2000" i="1" dirty="0"/>
+              <a:t> code block runs once </a:t>
+            </a:r>
+            <a:r>
+              <a:rPr lang="en-US" sz="2000" i="1" u="sng" dirty="0"/>
+              <a:t>for each</a:t>
+            </a:r>
+            <a:r>
+              <a:rPr lang="en-US" sz="2000" i="1" dirty="0"/>
+              <a:t> input coming through the pipeline.</a:t>
+            </a:r>
+          </a:p>
+          <a:p>
+            <a:pPr algn="r"/>
+            <a:r>
+              <a:rPr lang="en-US" sz="2000" i="1" dirty="0"/>
+              <a:t>The </a:t>
+            </a:r>
+            <a:r>
+              <a:rPr lang="en-US" sz="2000" b="1" dirty="0"/>
+              <a:t>end</a:t>
+            </a:r>
+            <a:r>
+              <a:rPr lang="en-US" sz="2000" i="1" dirty="0"/>
+              <a:t> code block runs once </a:t>
+            </a:r>
+            <a:r>
+              <a:rPr lang="en-US" sz="2000" i="1" u="sng" dirty="0"/>
+              <a:t>after</a:t>
+            </a:r>
+            <a:r>
+              <a:rPr lang="en-US" sz="2000" i="1" dirty="0"/>
+              <a:t> all of the pipeline input has been processed. </a:t>
+            </a:r>
+          </a:p>
+        </p:txBody>
+      </p:sp>
+    </p:spTree>
+    <p:extLst>
+      <p:ext uri="{BB962C8B-B14F-4D97-AF65-F5344CB8AC3E}">
+        <p14:creationId xmlns:p14="http://schemas.microsoft.com/office/powerpoint/2010/main" val="692615606"/>
       </p:ext>
     </p:extLst>
   </p:cSld>

</xml_diff>